<commit_message>
polish both slide sets
</commit_message>
<xml_diff>
--- a/Assets/Game/Gui/Explanation/Sprites/CHF Slides - Concise .pptx
+++ b/Assets/Game/Gui/Explanation/Sprites/CHF Slides - Concise .pptx
@@ -1040,7 +1040,7 @@
         </p:nvSpPr>
         <p:spPr>
           <a:xfrm>
-            <a:off x="381300" y="685800"/>
+            <a:off x="381000" y="685800"/>
             <a:ext cx="6096000" cy="3429000"/>
           </a:xfrm>
           <a:custGeom>
@@ -1384,7 +1384,7 @@
         </p:nvSpPr>
         <p:spPr>
           <a:xfrm>
-            <a:off x="381300" y="685800"/>
+            <a:off x="381000" y="685800"/>
             <a:ext cx="6096000" cy="3429000"/>
           </a:xfrm>
           <a:custGeom>
@@ -1488,7 +1488,7 @@
         </p:nvSpPr>
         <p:spPr>
           <a:xfrm>
-            <a:off x="381300" y="685800"/>
+            <a:off x="381000" y="685800"/>
             <a:ext cx="6096000" cy="3429000"/>
           </a:xfrm>
           <a:custGeom>
@@ -1904,7 +1904,7 @@
         </p:nvSpPr>
         <p:spPr>
           <a:xfrm>
-            <a:off x="381300" y="685800"/>
+            <a:off x="381000" y="685800"/>
             <a:ext cx="6096000" cy="3429000"/>
           </a:xfrm>
           <a:custGeom>
@@ -7019,11 +7019,7 @@
             </a:pPr>
             <a:r>
               <a:rPr lang="en" dirty="0"/>
-              <a:t>Chapter 8: Use </a:t>
-            </a:r>
-            <a:r>
-              <a:rPr lang="en"/>
-              <a:t>Electric Pump </a:t>
+              <a:t>Chapter 8: Use Electric Pump </a:t>
             </a:r>
             <a:endParaRPr dirty="0"/>
           </a:p>
@@ -7041,8 +7037,8 @@
         </p:nvSpPr>
         <p:spPr>
           <a:xfrm>
-            <a:off x="198200" y="1166025"/>
-            <a:ext cx="5576700" cy="3366000"/>
+            <a:off x="198199" y="1166025"/>
+            <a:ext cx="5638057" cy="3366000"/>
           </a:xfrm>
           <a:prstGeom prst="rect">
             <a:avLst/>
@@ -7067,7 +7063,7 @@
               <a:buNone/>
             </a:pPr>
             <a:r>
-              <a:rPr lang="en" sz="1600">
+              <a:rPr lang="en" sz="1600" dirty="0">
                 <a:solidFill>
                   <a:schemeClr val="dk1"/>
                 </a:solidFill>
@@ -7075,14 +7071,14 @@
               <a:t>The electric pump which you used to pump out the basement is similar to a device called an LVAD (Left Ventricular Assist Device) which is used to treat heart failure. It is sometimes referred to as a “Bridge to Transplantation”. Heart transplants, while more common now are major surgical procedures with many challenges to overcome after surgery, including the body’s immune system rejecting the transplanted heart. In our game, the concept of a heart transplant was represented by our character’s option to buy a new house (on the top of the hill).</a:t>
             </a:r>
             <a:r>
-              <a:rPr lang="en">
+              <a:rPr lang="en" dirty="0">
                 <a:solidFill>
                   <a:schemeClr val="dk1"/>
                 </a:solidFill>
               </a:rPr>
               <a:t> </a:t>
             </a:r>
-            <a:endParaRPr>
+            <a:endParaRPr dirty="0">
               <a:solidFill>
                 <a:schemeClr val="dk1"/>
               </a:solidFill>
@@ -7170,7 +7166,7 @@
         <p:spPr>
           <a:xfrm>
             <a:off x="71825" y="1210200"/>
-            <a:ext cx="5703000" cy="3933300"/>
+            <a:ext cx="5764432" cy="3933300"/>
           </a:xfrm>
           <a:prstGeom prst="rect">
             <a:avLst/>
@@ -7192,14 +7188,14 @@
               <a:buNone/>
             </a:pPr>
             <a:r>
-              <a:rPr lang="en" sz="1200">
+              <a:rPr lang="en" sz="1200" dirty="0">
                 <a:solidFill>
                   <a:schemeClr val="dk1"/>
                 </a:solidFill>
               </a:rPr>
               <a:t>Congratulations! Working through our Flooded Basement game, we hope to have provided you with some of the thought processes drugs and therapies used in the treatment of heart failure. Some of the “common sense” you applied to pumping the water from the basement are similar to principles in treatment of heart failure. Some of these include:</a:t>
             </a:r>
-            <a:endParaRPr sz="1200">
+            <a:endParaRPr sz="1200" dirty="0">
               <a:solidFill>
                 <a:schemeClr val="dk1"/>
               </a:solidFill>
@@ -7216,14 +7212,14 @@
               <a:buNone/>
             </a:pPr>
             <a:r>
-              <a:rPr lang="en" sz="1200">
+              <a:rPr lang="en" sz="1200" dirty="0">
                 <a:solidFill>
                   <a:schemeClr val="dk1"/>
                 </a:solidFill>
               </a:rPr>
               <a:t>Increasing Stroke Volume (larger pump handle) to Increase Cardiac Output (Stroke Volume x Heart Rate). Afterload reduction (the larger diameter hose from the pump to the window). Recruit more heart muscle to pump more effectively (Calling your friend Tony and feeding him so he would keep pumping effectively). The electric pump equates to the Left Ventricular Assist Device and the buying a New House represents cardiac transplant. Other things cardiologist may consider include treating valvular abnormalities and rhythm problems which if correctable may also help to improve cardiac function. In addition there are some other medications which can help which include diuretics (increase urination) and nitrates (to improve blood flow to the heart muscle to improve contractility and cardiac output. Newer Medications you may take include ACE inhibitors and ARBs.</a:t>
             </a:r>
-            <a:endParaRPr sz="1200">
+            <a:endParaRPr sz="1200" dirty="0">
               <a:solidFill>
                 <a:schemeClr val="dk1"/>
               </a:solidFill>
@@ -7239,7 +7235,7 @@
               </a:spcAft>
               <a:buNone/>
             </a:pPr>
-            <a:endParaRPr sz="1300"/>
+            <a:endParaRPr sz="1300" dirty="0"/>
           </a:p>
         </p:txBody>
       </p:sp>
@@ -7835,10 +7831,10 @@
               <a:buNone/>
             </a:pPr>
             <a:r>
-              <a:rPr lang="en"/>
-              <a:t>Chapter 2: Try New Parts (Improve Cardiac Function)</a:t>
+              <a:rPr lang="en" dirty="0"/>
+              <a:t>Chapter 2: Try New Parts</a:t>
             </a:r>
-            <a:endParaRPr/>
+            <a:endParaRPr dirty="0"/>
           </a:p>
         </p:txBody>
       </p:sp>
@@ -8207,10 +8203,10 @@
               <a:buNone/>
             </a:pPr>
             <a:r>
-              <a:rPr lang="en"/>
-              <a:t>#TODO Chapter 3: Recruit Muscle</a:t>
+              <a:rPr lang="en" dirty="0"/>
+              <a:t>Chapter 3: Recruit Muscle</a:t>
             </a:r>
-            <a:endParaRPr/>
+            <a:endParaRPr dirty="0"/>
           </a:p>
         </p:txBody>
       </p:sp>
@@ -8227,7 +8223,7 @@
         <p:spPr>
           <a:xfrm>
             <a:off x="311700" y="1152475"/>
-            <a:ext cx="5442000" cy="3555600"/>
+            <a:ext cx="5492752" cy="4139564"/>
           </a:xfrm>
           <a:prstGeom prst="rect">
             <a:avLst/>
@@ -8239,7 +8235,7 @@
           </a:bodyPr>
           <a:lstStyle/>
           <a:p>
-            <a:pPr marL="0" lvl="0" indent="0" algn="l" rtl="0">
+            <a:pPr marL="114300" indent="0" rtl="0">
               <a:spcBef>
                 <a:spcPts val="0"/>
               </a:spcBef>
@@ -8249,14 +8245,140 @@
               <a:buNone/>
             </a:pPr>
             <a:r>
-              <a:rPr lang="en" sz="1200">
+              <a:rPr lang="en-US" sz="1200" b="0" i="0" u="none" strike="noStrike" dirty="0">
                 <a:solidFill>
-                  <a:schemeClr val="dk1"/>
+                  <a:srgbClr val="000000"/>
                 </a:solidFill>
+                <a:effectLst/>
+                <a:latin typeface="Arial" panose="020B0604020202020204" pitchFamily="34" charset="0"/>
               </a:rPr>
-              <a:t>As you were thinking about working the pump up and down, you thought this is a lot of work. It is a lot of work for the heart as well. So let us now think about “muscle”. The heart is a muscle (or a pump). The heart muscle can be weakened by a variety of problems including pump problems and electrical problems. Pump problems include things like angina, a lack of blood flow and oxygen which weakens the heart muscle. You would be increasingly tired if you could not take a break to get some food and a drink. Other pump problems in the real heart (and our pump) include things like leaky (regurgitant) or tight (stenotic) valves which can impact cardiac output or affect the unidirectional flow of blood. Electrical problems can include things like cardiac arrhythmias (like afib or others in the heart) or electrical problems with a pump. So, in the real heart, drugs like digoxin, or Entresto and other measures may be used to improve contractility (how effectively the heart pumps). These drugs or other maneuvers help to recruit muscle. In our game the recruitment of muscle was calling our big friend Tony and letting him work the pump.</a:t>
+              <a:t>The heart muscle can be weakened by a variety of problems, including pump problems and electrical problems. </a:t>
             </a:r>
-            <a:endParaRPr sz="1200" b="1">
+            <a:endParaRPr lang="en-US" sz="1200" b="0" dirty="0">
+              <a:effectLst/>
+            </a:endParaRPr>
+          </a:p>
+          <a:p>
+            <a:pPr marL="114300" indent="0" rtl="0">
+              <a:spcBef>
+                <a:spcPts val="0"/>
+              </a:spcBef>
+              <a:spcAft>
+                <a:spcPts val="1200"/>
+              </a:spcAft>
+              <a:buNone/>
+            </a:pPr>
+            <a:r>
+              <a:rPr lang="en-US" sz="1200" b="0" i="0" u="none" strike="noStrike" dirty="0">
+                <a:solidFill>
+                  <a:srgbClr val="000000"/>
+                </a:solidFill>
+                <a:effectLst/>
+                <a:latin typeface="Arial" panose="020B0604020202020204" pitchFamily="34" charset="0"/>
+              </a:rPr>
+              <a:t>Pump problems include things like angina, a lack of blood flow and oxygen which weakens the heart muscle. You would be increasingly tired if you could not take a break to get some food and a drink. </a:t>
+            </a:r>
+            <a:endParaRPr lang="en-US" sz="1200" b="0" dirty="0">
+              <a:effectLst/>
+            </a:endParaRPr>
+          </a:p>
+          <a:p>
+            <a:pPr marL="114300" indent="0" rtl="0">
+              <a:spcBef>
+                <a:spcPts val="0"/>
+              </a:spcBef>
+              <a:spcAft>
+                <a:spcPts val="1200"/>
+              </a:spcAft>
+              <a:buNone/>
+            </a:pPr>
+            <a:r>
+              <a:rPr lang="en-US" sz="1200" b="0" i="0" u="none" strike="noStrike" dirty="0">
+                <a:solidFill>
+                  <a:srgbClr val="000000"/>
+                </a:solidFill>
+                <a:effectLst/>
+                <a:latin typeface="Arial" panose="020B0604020202020204" pitchFamily="34" charset="0"/>
+              </a:rPr>
+              <a:t>Other pump problems in the real heart include things like leaky (regurgitant) or tight (stenotic) valves, which can impact cardiac output or affect the unidirectional flow of blood. </a:t>
+            </a:r>
+            <a:endParaRPr lang="en-US" sz="1200" b="0" dirty="0">
+              <a:effectLst/>
+            </a:endParaRPr>
+          </a:p>
+          <a:p>
+            <a:pPr marL="114300" indent="0" rtl="0">
+              <a:spcBef>
+                <a:spcPts val="0"/>
+              </a:spcBef>
+              <a:spcAft>
+                <a:spcPts val="1200"/>
+              </a:spcAft>
+              <a:buNone/>
+            </a:pPr>
+            <a:r>
+              <a:rPr lang="en-US" sz="1200" b="0" i="0" u="none" strike="noStrike" dirty="0">
+                <a:solidFill>
+                  <a:srgbClr val="000000"/>
+                </a:solidFill>
+                <a:effectLst/>
+                <a:latin typeface="Arial" panose="020B0604020202020204" pitchFamily="34" charset="0"/>
+              </a:rPr>
+              <a:t>Electrical problems can include things like cardiac arrhythmias (like </a:t>
+            </a:r>
+            <a:r>
+              <a:rPr lang="en-US" sz="1200" b="0" i="0" u="none" strike="noStrike" dirty="0" err="1">
+                <a:solidFill>
+                  <a:srgbClr val="000000"/>
+                </a:solidFill>
+                <a:effectLst/>
+                <a:latin typeface="Arial" panose="020B0604020202020204" pitchFamily="34" charset="0"/>
+              </a:rPr>
+              <a:t>afib</a:t>
+            </a:r>
+            <a:r>
+              <a:rPr lang="en-US" sz="1200" b="0" i="0" u="none" strike="noStrike" dirty="0">
+                <a:solidFill>
+                  <a:srgbClr val="000000"/>
+                </a:solidFill>
+                <a:effectLst/>
+                <a:latin typeface="Arial" panose="020B0604020202020204" pitchFamily="34" charset="0"/>
+              </a:rPr>
+              <a:t> or others in the heart) or electrical problems with a pump. </a:t>
+            </a:r>
+            <a:endParaRPr lang="en-US" sz="1200" b="0" dirty="0">
+              <a:effectLst/>
+            </a:endParaRPr>
+          </a:p>
+          <a:p>
+            <a:pPr marL="114300" indent="0" rtl="0">
+              <a:spcBef>
+                <a:spcPts val="0"/>
+              </a:spcBef>
+              <a:spcAft>
+                <a:spcPts val="1200"/>
+              </a:spcAft>
+              <a:buNone/>
+            </a:pPr>
+            <a:r>
+              <a:rPr lang="en-US" sz="1200" b="0" i="0" u="none" strike="noStrike" dirty="0">
+                <a:solidFill>
+                  <a:srgbClr val="000000"/>
+                </a:solidFill>
+                <a:effectLst/>
+                <a:latin typeface="Arial" panose="020B0604020202020204" pitchFamily="34" charset="0"/>
+              </a:rPr>
+              <a:t>So, in the real heart, drugs like digoxin, or Entresto and other measures may be used to improve contractility (how effectively the heart pumps). These drugs or other maneuvers help to recruit muscle. In our game the recruitment of muscle was calling our big friend Tony and letting him work the pump.</a:t>
+            </a:r>
+            <a:endParaRPr lang="en-US" sz="1200" b="0" dirty="0">
+              <a:effectLst/>
+            </a:endParaRPr>
+          </a:p>
+          <a:p>
+            <a:pPr marL="114300" indent="0">
+              <a:buNone/>
+            </a:pPr>
+            <a:endParaRPr lang="en-US" sz="1200" b="1" dirty="0">
               <a:solidFill>
                 <a:schemeClr val="dk1"/>
               </a:solidFill>
@@ -8906,8 +9028,8 @@
         </p:blipFill>
         <p:spPr>
           <a:xfrm>
-            <a:off x="3925500" y="1300875"/>
-            <a:ext cx="5922788" cy="3848100"/>
+            <a:off x="3834300" y="1272208"/>
+            <a:ext cx="5309700" cy="3338802"/>
           </a:xfrm>
           <a:prstGeom prst="rect">
             <a:avLst/>

</xml_diff>